<commit_message>
Update Presentación Mentoría DiploDatos.pptx
</commit_message>
<xml_diff>
--- a/00 - Mentorias/6. Mentoria PPT Final/Presentación Mentoría DiploDatos.pptx
+++ b/00 - Mentorias/6. Mentoria PPT Final/Presentación Mentoría DiploDatos.pptx
@@ -113,6 +113,11 @@
       </a:defRPr>
     </a:lvl9pPr>
   </p:defaultTextStyle>
+  <p:extLst>
+    <p:ext uri="{EFAFB233-063F-42B5-8137-9DF3F51BA10A}">
+      <p15:sldGuideLst xmlns:p15="http://schemas.microsoft.com/office/powerpoint/2012/main"/>
+    </p:ext>
+  </p:extLst>
 </p:presentation>
 </file>
 
@@ -4536,7 +4541,7 @@
         <p:spPr>
           <a:xfrm>
             <a:off x="291547" y="1250543"/>
-            <a:ext cx="10376453" cy="1143070"/>
+            <a:ext cx="10376453" cy="589072"/>
           </a:xfrm>
           <a:prstGeom prst="rect">
             <a:avLst/>
@@ -4558,60 +4563,7 @@
             </a:pPr>
             <a:r>
               <a:rPr lang="pt-BR" sz="2400" b="1" dirty="0"/>
-              <a:t>RESUMEN: </a:t>
-            </a:r>
-            <a:r>
-              <a:rPr lang="pt-BR" sz="2400" dirty="0" err="1"/>
-              <a:t>Datos</a:t>
-            </a:r>
-            <a:r>
-              <a:rPr lang="pt-BR" sz="2400" dirty="0"/>
-              <a:t> de propriedades de </a:t>
-            </a:r>
-            <a:r>
-              <a:rPr lang="pt-BR" sz="2400" dirty="0" err="1"/>
-              <a:t>la</a:t>
-            </a:r>
-            <a:r>
-              <a:rPr lang="pt-BR" sz="2400" dirty="0"/>
-              <a:t> </a:t>
-            </a:r>
-            <a:r>
-              <a:rPr lang="pt-BR" sz="2400" dirty="0" err="1"/>
-              <a:t>Ciudad</a:t>
-            </a:r>
-            <a:r>
-              <a:rPr lang="pt-BR" sz="2400" dirty="0"/>
-              <a:t> de Buenos Aires del a</a:t>
-            </a:r>
-            <a:r>
-              <a:rPr lang="es-ES" sz="2400" dirty="0" err="1"/>
-              <a:t>ño</a:t>
-            </a:r>
-            <a:r>
-              <a:rPr lang="es-ES" sz="2400" dirty="0"/>
-              <a:t> 2017</a:t>
-            </a:r>
-          </a:p>
-          <a:p>
-            <a:pPr marL="285750" indent="-285750">
-              <a:lnSpc>
-                <a:spcPct val="150000"/>
-              </a:lnSpc>
-              <a:buFont typeface="Arial" panose="020B0604020202020204" pitchFamily="34" charset="0"/>
-              <a:buChar char="•"/>
-            </a:pPr>
-            <a:r>
-              <a:rPr lang="es-ES" sz="2400" b="1" dirty="0"/>
-              <a:t>FUENTE</a:t>
-            </a:r>
-            <a:r>
-              <a:rPr lang="pt-BR" sz="2400" b="1" dirty="0"/>
-              <a:t>: </a:t>
-            </a:r>
-            <a:r>
-              <a:rPr lang="pt-BR" sz="2400" dirty="0"/>
-              <a:t>www.properati.com.ar</a:t>
+              <a:t>COMPLETAR</a:t>
             </a:r>
             <a:endParaRPr lang="es-AR" sz="2400" dirty="0"/>
           </a:p>
@@ -4895,7 +4847,7 @@
         </p:nvSpPr>
         <p:spPr>
           <a:xfrm>
-            <a:off x="805218" y="1118816"/>
+            <a:off x="805218" y="1039304"/>
             <a:ext cx="846161" cy="928047"/>
           </a:xfrm>
           <a:prstGeom prst="roundRect">
@@ -4945,7 +4897,7 @@
         </p:nvSpPr>
         <p:spPr>
           <a:xfrm>
-            <a:off x="1815547" y="1288303"/>
+            <a:off x="1815547" y="1208791"/>
             <a:ext cx="10376453" cy="589072"/>
           </a:xfrm>
           <a:prstGeom prst="rect">

</xml_diff>